<commit_message>
changes for combinations of sources
</commit_message>
<xml_diff>
--- a/schema_update.pptx
+++ b/schema_update.pptx
@@ -243,7 +243,7 @@
           <a:p>
             <a:fld id="{18779423-775B-4B9B-BC8A-823BAA57B93D}" type="datetimeFigureOut">
               <a:rPr lang="en-US" smtClean="0"/>
-              <a:t>8/14/2016</a:t>
+              <a:t>8/25/2016</a:t>
             </a:fld>
             <a:endParaRPr lang="en-US"/>
           </a:p>
@@ -413,7 +413,7 @@
           <a:p>
             <a:fld id="{18779423-775B-4B9B-BC8A-823BAA57B93D}" type="datetimeFigureOut">
               <a:rPr lang="en-US" smtClean="0"/>
-              <a:t>8/14/2016</a:t>
+              <a:t>8/25/2016</a:t>
             </a:fld>
             <a:endParaRPr lang="en-US"/>
           </a:p>
@@ -593,7 +593,7 @@
           <a:p>
             <a:fld id="{18779423-775B-4B9B-BC8A-823BAA57B93D}" type="datetimeFigureOut">
               <a:rPr lang="en-US" smtClean="0"/>
-              <a:t>8/14/2016</a:t>
+              <a:t>8/25/2016</a:t>
             </a:fld>
             <a:endParaRPr lang="en-US"/>
           </a:p>
@@ -763,7 +763,7 @@
           <a:p>
             <a:fld id="{18779423-775B-4B9B-BC8A-823BAA57B93D}" type="datetimeFigureOut">
               <a:rPr lang="en-US" smtClean="0"/>
-              <a:t>8/14/2016</a:t>
+              <a:t>8/25/2016</a:t>
             </a:fld>
             <a:endParaRPr lang="en-US"/>
           </a:p>
@@ -1007,7 +1007,7 @@
           <a:p>
             <a:fld id="{18779423-775B-4B9B-BC8A-823BAA57B93D}" type="datetimeFigureOut">
               <a:rPr lang="en-US" smtClean="0"/>
-              <a:t>8/14/2016</a:t>
+              <a:t>8/25/2016</a:t>
             </a:fld>
             <a:endParaRPr lang="en-US"/>
           </a:p>
@@ -1239,7 +1239,7 @@
           <a:p>
             <a:fld id="{18779423-775B-4B9B-BC8A-823BAA57B93D}" type="datetimeFigureOut">
               <a:rPr lang="en-US" smtClean="0"/>
-              <a:t>8/14/2016</a:t>
+              <a:t>8/25/2016</a:t>
             </a:fld>
             <a:endParaRPr lang="en-US"/>
           </a:p>
@@ -1606,7 +1606,7 @@
           <a:p>
             <a:fld id="{18779423-775B-4B9B-BC8A-823BAA57B93D}" type="datetimeFigureOut">
               <a:rPr lang="en-US" smtClean="0"/>
-              <a:t>8/14/2016</a:t>
+              <a:t>8/25/2016</a:t>
             </a:fld>
             <a:endParaRPr lang="en-US"/>
           </a:p>
@@ -1724,7 +1724,7 @@
           <a:p>
             <a:fld id="{18779423-775B-4B9B-BC8A-823BAA57B93D}" type="datetimeFigureOut">
               <a:rPr lang="en-US" smtClean="0"/>
-              <a:t>8/14/2016</a:t>
+              <a:t>8/25/2016</a:t>
             </a:fld>
             <a:endParaRPr lang="en-US"/>
           </a:p>
@@ -1819,7 +1819,7 @@
           <a:p>
             <a:fld id="{18779423-775B-4B9B-BC8A-823BAA57B93D}" type="datetimeFigureOut">
               <a:rPr lang="en-US" smtClean="0"/>
-              <a:t>8/14/2016</a:t>
+              <a:t>8/25/2016</a:t>
             </a:fld>
             <a:endParaRPr lang="en-US"/>
           </a:p>
@@ -2096,7 +2096,7 @@
           <a:p>
             <a:fld id="{18779423-775B-4B9B-BC8A-823BAA57B93D}" type="datetimeFigureOut">
               <a:rPr lang="en-US" smtClean="0"/>
-              <a:t>8/14/2016</a:t>
+              <a:t>8/25/2016</a:t>
             </a:fld>
             <a:endParaRPr lang="en-US"/>
           </a:p>
@@ -2353,7 +2353,7 @@
           <a:p>
             <a:fld id="{18779423-775B-4B9B-BC8A-823BAA57B93D}" type="datetimeFigureOut">
               <a:rPr lang="en-US" smtClean="0"/>
-              <a:t>8/14/2016</a:t>
+              <a:t>8/25/2016</a:t>
             </a:fld>
             <a:endParaRPr lang="en-US"/>
           </a:p>
@@ -2566,7 +2566,7 @@
           <a:p>
             <a:fld id="{18779423-775B-4B9B-BC8A-823BAA57B93D}" type="datetimeFigureOut">
               <a:rPr lang="en-US" smtClean="0"/>
-              <a:t>8/14/2016</a:t>
+              <a:t>8/25/2016</a:t>
             </a:fld>
             <a:endParaRPr lang="en-US"/>
           </a:p>
@@ -6124,9 +6124,10 @@
           <a:p>
             <a:pPr algn="ctr"/>
             <a:r>
-              <a:rPr lang="en-US" sz="2000" b="1" dirty="0"/>
-              <a:t>All sources combined</a:t>
-            </a:r>
+              <a:rPr lang="en-US" sz="2000" b="1" dirty="0" smtClean="0"/>
+              <a:t>Combination of Sources</a:t>
+            </a:r>
+            <a:endParaRPr lang="en-US" sz="2000" b="1" dirty="0"/>
           </a:p>
         </p:txBody>
       </p:sp>
@@ -7117,8 +7118,8 @@
         </p:nvSpPr>
         <p:spPr>
           <a:xfrm>
-            <a:off x="8716330" y="15362723"/>
-            <a:ext cx="3084400" cy="1077218"/>
+            <a:off x="8716330" y="15324623"/>
+            <a:ext cx="3084400" cy="1138773"/>
           </a:xfrm>
           <a:prstGeom prst="rect">
             <a:avLst/>
@@ -7135,30 +7136,24 @@
           <a:lstStyle/>
           <a:p>
             <a:r>
-              <a:rPr lang="en-US" b="1" dirty="0"/>
-              <a:t>The gap is greatly reduced and almost eliminated</a:t>
-            </a:r>
-          </a:p>
-          <a:p>
+              <a:rPr lang="en-US" b="1" dirty="0" smtClean="0"/>
+              <a:t>Interactions exist when heterogeneity sources are combined </a:t>
+            </a:r>
+            <a:r>
+              <a:rPr lang="en-US" sz="1400" b="1" i="1" dirty="0" smtClean="0"/>
+              <a:t>(Supplementary </a:t>
+            </a:r>
             <a:r>
               <a:rPr lang="en-US" sz="1400" b="1" i="1" dirty="0"/>
-              <a:t>(F</a:t>
-            </a:r>
-            <a:r>
-              <a:rPr lang="en-US" altLang="zh-CN" sz="1400" b="1" i="1" dirty="0"/>
-              <a:t>igure </a:t>
-            </a:r>
-            <a:r>
-              <a:rPr lang="en-US" altLang="zh-CN" sz="1400" b="1" i="1" dirty="0" smtClean="0"/>
-              <a:t>2 and </a:t>
-            </a:r>
-            <a:r>
-              <a:rPr lang="en-US" sz="1400" b="1" i="1" dirty="0"/>
-              <a:t>Supplementary figures 1, </a:t>
+              <a:t>figures 1, </a:t>
             </a:r>
             <a:r>
               <a:rPr lang="en-US" sz="1400" b="1" i="1" dirty="0" smtClean="0"/>
-              <a:t>all of the above)</a:t>
+              <a:t>the last three panels from the right</a:t>
+            </a:r>
+            <a:r>
+              <a:rPr lang="en-US" sz="1400" b="1" i="1" dirty="0" smtClean="0"/>
+              <a:t>)</a:t>
             </a:r>
             <a:endParaRPr lang="en-US" sz="1400" b="1" i="1" dirty="0"/>
           </a:p>

</xml_diff>